<commit_message>
added challenge 3 slide to ppt
</commit_message>
<xml_diff>
--- a/Team Docs/Sprint 3 Planning Presentation.pptx
+++ b/Team Docs/Sprint 3 Planning Presentation.pptx
@@ -151,6 +151,10 @@
 </p:presentation>
 </file>
 
+<file path=ppt/revisionInfo.xml><?xml version="1.0" encoding="utf-8"?>
+<p1510:revInfo xmlns:a="http://schemas.openxmlformats.org/drawingml/2006/main" xmlns:r="http://schemas.openxmlformats.org/officeDocument/2006/relationships" xmlns:p1510="http://schemas.microsoft.com/office/powerpoint/2015/10/main"/>
+</file>
+
 <file path=ppt/handoutMasters/handoutMaster1.xml><?xml version="1.0" encoding="utf-8"?>
 <p:handoutMaster xmlns:a="http://schemas.openxmlformats.org/drawingml/2006/main" xmlns:r="http://schemas.openxmlformats.org/officeDocument/2006/relationships" xmlns:p="http://schemas.openxmlformats.org/presentationml/2006/main">
   <p:cSld>
@@ -233,7 +237,7 @@
           <a:p>
             <a:fld id="{705E03B7-B591-4A2A-B695-014C5A39F13E}" type="datetimeFigureOut">
               <a:rPr lang="en-US"/>
-              <a:t>5/19/2017</a:t>
+              <a:t>5/22/2017</a:t>
             </a:fld>
             <a:endParaRPr/>
           </a:p>
@@ -398,7 +402,7 @@
           <a:p>
             <a:fld id="{67DFBD7B-E4FB-4AA8-9540-FD148073ACB3}" type="datetimeFigureOut">
               <a:rPr lang="en-US"/>
-              <a:t>5/19/2017</a:t>
+              <a:t>5/22/2017</a:t>
             </a:fld>
             <a:endParaRPr/>
           </a:p>
@@ -1732,7 +1736,7 @@
           <a:p>
             <a:fld id="{A7209051-6E81-43E8-9099-FF6A0C3DCFE8}" type="datetime1">
               <a:rPr lang="en-US"/>
-              <a:t>5/19/2017</a:t>
+              <a:t>5/22/2017</a:t>
             </a:fld>
             <a:endParaRPr/>
           </a:p>
@@ -1933,7 +1937,7 @@
           <a:p>
             <a:fld id="{EDCEAB04-7709-4C1E-A61A-74684A0170FC}" type="datetime1">
               <a:rPr lang="en-US"/>
-              <a:t>5/19/2017</a:t>
+              <a:t>5/22/2017</a:t>
             </a:fld>
             <a:endParaRPr/>
           </a:p>
@@ -2483,7 +2487,7 @@
           <a:p>
             <a:fld id="{0C79BD0D-E0B1-4CED-AC65-708AC79EB9CD}" type="datetime1">
               <a:rPr lang="en-US"/>
-              <a:t>5/19/2017</a:t>
+              <a:t>5/22/2017</a:t>
             </a:fld>
             <a:endParaRPr/>
           </a:p>
@@ -2684,7 +2688,7 @@
           <a:p>
             <a:fld id="{0CC3EA6D-DF0B-4D4B-B359-5F1D1D0E30A4}" type="datetime1">
               <a:rPr lang="en-US"/>
-              <a:t>5/19/2017</a:t>
+              <a:t>5/22/2017</a:t>
             </a:fld>
             <a:endParaRPr/>
           </a:p>
@@ -3288,7 +3292,7 @@
           <a:p>
             <a:fld id="{977EDB99-15BC-4479-BAC5-1E502E66917A}" type="datetime1">
               <a:rPr lang="en-US"/>
-              <a:t>5/19/2017</a:t>
+              <a:t>5/22/2017</a:t>
             </a:fld>
             <a:endParaRPr/>
           </a:p>
@@ -3600,7 +3604,7 @@
           <a:p>
             <a:fld id="{4067C2A3-CD19-48AB-9F64-ECCF75182EDD}" type="datetime1">
               <a:rPr lang="en-US"/>
-              <a:t>5/19/2017</a:t>
+              <a:t>5/22/2017</a:t>
             </a:fld>
             <a:endParaRPr/>
           </a:p>
@@ -4062,7 +4066,7 @@
           <a:p>
             <a:fld id="{0363E8C1-7C87-4705-AB97-8CD17D208E3F}" type="datetime1">
               <a:rPr lang="en-US"/>
-              <a:t>5/19/2017</a:t>
+              <a:t>5/22/2017</a:t>
             </a:fld>
             <a:endParaRPr/>
           </a:p>
@@ -4195,7 +4199,7 @@
           <a:p>
             <a:fld id="{E20C624E-DF92-4841-B9B9-DD11AA239B85}" type="datetime1">
               <a:rPr lang="en-US"/>
-              <a:t>5/19/2017</a:t>
+              <a:t>5/22/2017</a:t>
             </a:fld>
             <a:endParaRPr/>
           </a:p>
@@ -4488,7 +4492,7 @@
           <a:p>
             <a:fld id="{FBDA3AE1-4360-4D5B-BDBC-656B872DD533}" type="datetime1">
               <a:rPr lang="en-US"/>
-              <a:t>5/19/2017</a:t>
+              <a:t>5/22/2017</a:t>
             </a:fld>
             <a:endParaRPr/>
           </a:p>
@@ -4787,7 +4791,7 @@
           <a:p>
             <a:fld id="{20990708-46A4-4851-883E-8DFB8939107E}" type="datetime1">
               <a:rPr lang="en-US"/>
-              <a:t>5/19/2017</a:t>
+              <a:t>5/22/2017</a:t>
             </a:fld>
             <a:endParaRPr/>
           </a:p>
@@ -5071,7 +5075,7 @@
           <a:p>
             <a:fld id="{AE88EFFC-86AE-4294-A319-CAFC2651994B}" type="datetime1">
               <a:rPr lang="en-US"/>
-              <a:t>5/19/2017</a:t>
+              <a:t>5/22/2017</a:t>
             </a:fld>
             <a:endParaRPr/>
           </a:p>
@@ -5653,7 +5657,7 @@
             <a:fld id="{D29E8617-6EA8-4B97-A5E8-E18E98765EE2}" type="datetime1">
               <a:rPr lang="en-US"/>
               <a:pPr/>
-              <a:t>5/19/2017</a:t>
+              <a:t>5/22/2017</a:t>
             </a:fld>
             <a:endParaRPr dirty="0"/>
           </a:p>
@@ -6690,7 +6694,12 @@
             <p:ph type="title"/>
           </p:nvPr>
         </p:nvSpPr>
-        <p:spPr/>
+        <p:spPr>
+          <a:xfrm>
+            <a:off x="1218883" y="152400"/>
+            <a:ext cx="9751060" cy="1295400"/>
+          </a:xfrm>
+        </p:spPr>
         <p:txBody>
           <a:bodyPr/>
           <a:lstStyle/>
@@ -7391,10 +7400,67 @@
           <a:bodyPr/>
           <a:lstStyle/>
           <a:p>
-            <a:endParaRPr lang="en-CA" dirty="0"/>
+            <a:r>
+              <a:rPr lang="en-CA" dirty="0"/>
+              <a:t>Connect our app to social media</a:t>
+            </a:r>
+          </a:p>
+          <a:p>
+            <a:pPr lvl="1"/>
+            <a:r>
+              <a:rPr lang="en-CA" dirty="0"/>
+              <a:t>Twitter or Facebook messages</a:t>
+            </a:r>
+          </a:p>
+          <a:p>
+            <a:r>
+              <a:rPr lang="en-CA" dirty="0"/>
+              <a:t>Let users log in using Google or social media ID</a:t>
+            </a:r>
           </a:p>
         </p:txBody>
       </p:sp>
+      <p:pic>
+        <p:nvPicPr>
+          <p:cNvPr id="4" name="Picture 4" descr="#"/>
+          <p:cNvPicPr>
+            <a:picLocks noChangeAspect="1" noChangeArrowheads="1"/>
+          </p:cNvPicPr>
+          <p:nvPr/>
+        </p:nvPicPr>
+        <p:blipFill>
+          <a:blip r:embed="rId3">
+            <a:extLst>
+              <a:ext uri="{28A0092B-C50C-407E-A947-70E740481C1C}">
+                <a14:useLocalDpi xmlns:a14="http://schemas.microsoft.com/office/drawing/2010/main" val="0"/>
+              </a:ext>
+            </a:extLst>
+          </a:blip>
+          <a:srcRect/>
+          <a:stretch>
+            <a:fillRect/>
+          </a:stretch>
+        </p:blipFill>
+        <p:spPr bwMode="auto">
+          <a:xfrm>
+            <a:off x="5086300" y="2636912"/>
+            <a:ext cx="676275" cy="857250"/>
+          </a:xfrm>
+          <a:prstGeom prst="rect">
+            <a:avLst/>
+          </a:prstGeom>
+          <a:noFill/>
+          <a:extLst>
+            <a:ext uri="{909E8E84-426E-40DD-AFC4-6F175D3DCCD1}">
+              <a14:hiddenFill xmlns:a14="http://schemas.microsoft.com/office/drawing/2010/main">
+                <a:solidFill>
+                  <a:srgbClr val="FFFFFF"/>
+                </a:solidFill>
+              </a14:hiddenFill>
+            </a:ext>
+          </a:extLst>
+        </p:spPr>
+      </p:pic>
     </p:spTree>
     <p:extLst>
       <p:ext uri="{BB962C8B-B14F-4D97-AF65-F5344CB8AC3E}">
@@ -7417,6 +7483,89 @@
       </p:transition>
     </mc:Fallback>
   </mc:AlternateContent>
+  <p:timing>
+    <p:tnLst>
+      <p:par>
+        <p:cTn id="1" dur="indefinite" restart="never" nodeType="tmRoot">
+          <p:childTnLst>
+            <p:seq concurrent="1" nextAc="seek">
+              <p:cTn id="2" dur="indefinite" nodeType="mainSeq">
+                <p:childTnLst>
+                  <p:par>
+                    <p:cTn id="3" fill="hold">
+                      <p:stCondLst>
+                        <p:cond delay="indefinite"/>
+                      </p:stCondLst>
+                      <p:childTnLst>
+                        <p:par>
+                          <p:cTn id="4" fill="hold">
+                            <p:stCondLst>
+                              <p:cond delay="0"/>
+                            </p:stCondLst>
+                            <p:childTnLst>
+                              <p:par>
+                                <p:cTn id="5" presetID="22" presetClass="entr" presetSubtype="4" fill="hold" nodeType="clickEffect">
+                                  <p:stCondLst>
+                                    <p:cond delay="0"/>
+                                  </p:stCondLst>
+                                  <p:childTnLst>
+                                    <p:set>
+                                      <p:cBhvr>
+                                        <p:cTn id="6" dur="1" fill="hold">
+                                          <p:stCondLst>
+                                            <p:cond delay="0"/>
+                                          </p:stCondLst>
+                                        </p:cTn>
+                                        <p:tgtEl>
+                                          <p:spTgt spid="4"/>
+                                        </p:tgtEl>
+                                        <p:attrNameLst>
+                                          <p:attrName>style.visibility</p:attrName>
+                                        </p:attrNameLst>
+                                      </p:cBhvr>
+                                      <p:to>
+                                        <p:strVal val="visible"/>
+                                      </p:to>
+                                    </p:set>
+                                    <p:animEffect transition="in" filter="wipe(down)">
+                                      <p:cBhvr>
+                                        <p:cTn id="7" dur="500"/>
+                                        <p:tgtEl>
+                                          <p:spTgt spid="4"/>
+                                        </p:tgtEl>
+                                      </p:cBhvr>
+                                    </p:animEffect>
+                                  </p:childTnLst>
+                                </p:cTn>
+                              </p:par>
+                            </p:childTnLst>
+                          </p:cTn>
+                        </p:par>
+                      </p:childTnLst>
+                    </p:cTn>
+                  </p:par>
+                </p:childTnLst>
+              </p:cTn>
+              <p:prevCondLst>
+                <p:cond evt="onPrev" delay="0">
+                  <p:tgtEl>
+                    <p:sldTgt/>
+                  </p:tgtEl>
+                </p:cond>
+              </p:prevCondLst>
+              <p:nextCondLst>
+                <p:cond evt="onNext" delay="0">
+                  <p:tgtEl>
+                    <p:sldTgt/>
+                  </p:tgtEl>
+                </p:cond>
+              </p:nextCondLst>
+            </p:seq>
+          </p:childTnLst>
+        </p:cTn>
+      </p:par>
+    </p:tnLst>
+  </p:timing>
 </p:sld>
 </file>
 
@@ -10430,6 +10579,15 @@
 </file>
 
 <file path=customXml/item2.xml><?xml version="1.0" encoding="utf-8"?>
+<?mso-contentType ?>
+<FormTemplates xmlns="http://schemas.microsoft.com/sharepoint/v3/contenttype/forms">
+  <Display>DocumentLibraryForm</Display>
+  <Edit>DocumentLibraryForm</Edit>
+  <New>DocumentLibraryForm</New>
+</FormTemplates>
+</file>
+
+<file path=customXml/item3.xml><?xml version="1.0" encoding="utf-8"?>
 <p:properties xmlns:p="http://schemas.microsoft.com/office/2006/metadata/properties" xmlns:xsi="http://www.w3.org/2001/XMLSchema-instance" xmlns:pc="http://schemas.microsoft.com/office/infopath/2007/PartnerControls">
   <documentManagement>
     <VSO_x0020_item_x0020_id xmlns="40262f94-9f35-4ac3-9a90-690165a166b7" xsi:nil="true"/>
@@ -10438,15 +10596,6 @@
     <Template_x0020_details xmlns="40262f94-9f35-4ac3-9a90-690165a166b7" xsi:nil="true"/>
   </documentManagement>
 </p:properties>
-</file>
-
-<file path=customXml/item3.xml><?xml version="1.0" encoding="utf-8"?>
-<?mso-contentType ?>
-<FormTemplates xmlns="http://schemas.microsoft.com/sharepoint/v3/contenttype/forms">
-  <Display>DocumentLibraryForm</Display>
-  <Edit>DocumentLibraryForm</Edit>
-  <New>DocumentLibraryForm</New>
-</FormTemplates>
 </file>
 
 <file path=customXml/itemProps1.xml><?xml version="1.0" encoding="utf-8"?>
@@ -10469,6 +10618,14 @@
 </file>
 
 <file path=customXml/itemProps2.xml><?xml version="1.0" encoding="utf-8"?>
+<ds:datastoreItem xmlns:ds="http://schemas.openxmlformats.org/officeDocument/2006/customXml" ds:itemID="{308942AA-0721-4324-BC2C-A3CB43F24E71}">
+  <ds:schemaRefs>
+    <ds:schemaRef ds:uri="http://schemas.microsoft.com/sharepoint/v3/contenttype/forms"/>
+  </ds:schemaRefs>
+</ds:datastoreItem>
+</file>
+
+<file path=customXml/itemProps3.xml><?xml version="1.0" encoding="utf-8"?>
 <ds:datastoreItem xmlns:ds="http://schemas.openxmlformats.org/officeDocument/2006/customXml" ds:itemID="{5E700CCB-20BA-4760-AB9F-AC3B63ED32E0}">
   <ds:schemaRefs>
     <ds:schemaRef ds:uri="http://schemas.microsoft.com/office/2006/documentManagement/types"/>
@@ -10483,12 +10640,4 @@
     <ds:schemaRef ds:uri="http://purl.org/dc/dcmitype/"/>
   </ds:schemaRefs>
 </ds:datastoreItem>
-</file>
-
-<file path=customXml/itemProps3.xml><?xml version="1.0" encoding="utf-8"?>
-<ds:datastoreItem xmlns:ds="http://schemas.openxmlformats.org/officeDocument/2006/customXml" ds:itemID="{308942AA-0721-4324-BC2C-A3CB43F24E71}">
-  <ds:schemaRefs>
-    <ds:schemaRef ds:uri="http://schemas.microsoft.com/sharepoint/v3/contenttype/forms"/>
-  </ds:schemaRefs>
-</ds:datastoreItem>
 </file>
</xml_diff>